<commit_message>
Added CORS to /api/submit-score Added log messages Edited presentation
</commit_message>
<xml_diff>
--- a/cyprus-water.pptx
+++ b/cyprus-water.pptx
@@ -10,6 +10,7 @@
     <p:sldId id="259" r:id="rId4"/>
     <p:sldId id="260" r:id="rId5"/>
     <p:sldId id="257" r:id="rId6"/>
+    <p:sldId id="261" r:id="rId7"/>
   </p:sldIdLst>
   <p:sldSz cx="12192000" cy="6858000"/>
   <p:notesSz cx="6858000" cy="9144000"/>
@@ -4387,7 +4388,7 @@
         <p:spPr>
           <a:xfrm>
             <a:off x="8812537" y="305855"/>
-            <a:ext cx="2774096" cy="277273"/>
+            <a:ext cx="2843656" cy="277273"/>
           </a:xfrm>
           <a:prstGeom prst="rect">
             <a:avLst/>
@@ -4689,12 +4690,14 @@
         </p:nvSpPr>
         <p:spPr>
           <a:xfrm>
-            <a:off x="838200" y="1399363"/>
-            <a:ext cx="10515600" cy="4527049"/>
+            <a:off x="618767" y="1399363"/>
+            <a:ext cx="11451477" cy="4527049"/>
           </a:xfrm>
         </p:spPr>
         <p:txBody>
-          <a:bodyPr/>
+          <a:bodyPr>
+            <a:normAutofit/>
+          </a:bodyPr>
           <a:lstStyle/>
           <a:p>
             <a:r>
@@ -4707,7 +4710,19 @@
             </a:r>
             <a:r>
               <a:rPr lang="en-CY" sz="2400" dirty="0"/>
-              <a:t> to collect and maintain important data regarding water resources in Cyprus and make them available as Open Data</a:t>
+              <a:t> to collect and maintain important data regarding water resources in Cyprus and make them available </a:t>
+            </a:r>
+            <a:r>
+              <a:rPr lang="en-CY" sz="2400" b="1" dirty="0"/>
+              <a:t>Visually </a:t>
+            </a:r>
+            <a:r>
+              <a:rPr lang="en-CY" sz="2400" dirty="0"/>
+              <a:t>and as </a:t>
+            </a:r>
+            <a:r>
+              <a:rPr lang="en-CY" sz="2400" b="1" dirty="0"/>
+              <a:t>Open Data</a:t>
             </a:r>
           </a:p>
           <a:p>
@@ -4760,7 +4775,7 @@
           <a:p>
             <a:r>
               <a:rPr lang="en-CY" sz="2400" dirty="0"/>
-              <a:t>Developed a fun-facts quiz for engaging teenagers with understanding water quantities and the potential impact of saving actions</a:t>
+              <a:t>Developed a fun-facts quiz for engaging teenagers with understanding water quantities and the potential impact of simple water saving actions</a:t>
             </a:r>
             <a:endParaRPr lang="en-CY" dirty="0"/>
           </a:p>
@@ -8392,6 +8407,133 @@
 </p:sld>
 </file>
 
+<file path=ppt/slides/slide6.xml><?xml version="1.0" encoding="utf-8"?>
+<p:sld xmlns:a="http://schemas.openxmlformats.org/drawingml/2006/main" xmlns:r="http://schemas.openxmlformats.org/officeDocument/2006/relationships" xmlns:p="http://schemas.openxmlformats.org/presentationml/2006/main">
+  <p:cSld>
+    <p:spTree>
+      <p:nvGrpSpPr>
+        <p:cNvPr id="1" name=""/>
+        <p:cNvGrpSpPr/>
+        <p:nvPr/>
+      </p:nvGrpSpPr>
+      <p:grpSpPr>
+        <a:xfrm>
+          <a:off x="0" y="0"/>
+          <a:ext cx="0" cy="0"/>
+          <a:chOff x="0" y="0"/>
+          <a:chExt cx="0" cy="0"/>
+        </a:xfrm>
+      </p:grpSpPr>
+      <p:sp>
+        <p:nvSpPr>
+          <p:cNvPr id="2" name="Title 1">
+            <a:extLst>
+              <a:ext uri="{FF2B5EF4-FFF2-40B4-BE49-F238E27FC236}">
+                <a16:creationId xmlns:a16="http://schemas.microsoft.com/office/drawing/2014/main" id="{1F257FD8-9785-46CF-A43D-D044F50F1E89}"/>
+              </a:ext>
+            </a:extLst>
+          </p:cNvPr>
+          <p:cNvSpPr>
+            <a:spLocks noGrp="1"/>
+          </p:cNvSpPr>
+          <p:nvPr>
+            <p:ph type="title"/>
+          </p:nvPr>
+        </p:nvSpPr>
+        <p:spPr/>
+        <p:txBody>
+          <a:bodyPr/>
+          <a:lstStyle/>
+          <a:p>
+            <a:r>
+              <a:rPr lang="en-CY" dirty="0"/>
+              <a:t>Live Demo</a:t>
+            </a:r>
+          </a:p>
+        </p:txBody>
+      </p:sp>
+      <p:sp>
+        <p:nvSpPr>
+          <p:cNvPr id="3" name="Content Placeholder 2">
+            <a:extLst>
+              <a:ext uri="{FF2B5EF4-FFF2-40B4-BE49-F238E27FC236}">
+                <a16:creationId xmlns:a16="http://schemas.microsoft.com/office/drawing/2014/main" id="{30408E3C-3CD3-4102-A5DD-964C945B0AB2}"/>
+              </a:ext>
+            </a:extLst>
+          </p:cNvPr>
+          <p:cNvSpPr>
+            <a:spLocks noGrp="1"/>
+          </p:cNvSpPr>
+          <p:nvPr>
+            <p:ph idx="1"/>
+          </p:nvPr>
+        </p:nvSpPr>
+        <p:spPr/>
+        <p:txBody>
+          <a:bodyPr/>
+          <a:lstStyle/>
+          <a:p>
+            <a:pPr marL="0" indent="0">
+              <a:buNone/>
+            </a:pPr>
+            <a:r>
+              <a:rPr lang="en-CY" dirty="0"/>
+              <a:t>...</a:t>
+            </a:r>
+          </a:p>
+        </p:txBody>
+      </p:sp>
+      <p:sp>
+        <p:nvSpPr>
+          <p:cNvPr id="4" name="TextBox 3">
+            <a:extLst>
+              <a:ext uri="{FF2B5EF4-FFF2-40B4-BE49-F238E27FC236}">
+                <a16:creationId xmlns:a16="http://schemas.microsoft.com/office/drawing/2014/main" id="{94D33AB1-E0F4-4C86-BEAB-EE1F0C00B73D}"/>
+              </a:ext>
+            </a:extLst>
+          </p:cNvPr>
+          <p:cNvSpPr txBox="1"/>
+          <p:nvPr/>
+        </p:nvSpPr>
+        <p:spPr>
+          <a:xfrm>
+            <a:off x="8544591" y="6415418"/>
+            <a:ext cx="3647409" cy="400110"/>
+          </a:xfrm>
+          <a:prstGeom prst="rect">
+            <a:avLst/>
+          </a:prstGeom>
+          <a:noFill/>
+        </p:spPr>
+        <p:txBody>
+          <a:bodyPr wrap="none" rtlCol="0">
+            <a:spAutoFit/>
+          </a:bodyPr>
+          <a:lstStyle/>
+          <a:p>
+            <a:r>
+              <a:rPr lang="en-CY" sz="2000" dirty="0">
+                <a:hlinkClick r:id="rId2"/>
+              </a:rPr>
+              <a:t>http://cyprus-water.appspot.com</a:t>
+            </a:r>
+            <a:endParaRPr lang="en-CY" sz="2000" dirty="0"/>
+          </a:p>
+        </p:txBody>
+      </p:sp>
+    </p:spTree>
+    <p:extLst>
+      <p:ext uri="{BB962C8B-B14F-4D97-AF65-F5344CB8AC3E}">
+        <p14:creationId xmlns:p14="http://schemas.microsoft.com/office/powerpoint/2010/main" val="3351914282"/>
+      </p:ext>
+    </p:extLst>
+  </p:cSld>
+  <p:clrMapOvr>
+    <a:masterClrMapping/>
+  </p:clrMapOvr>
+</p:sld>
+</file>
+
 <file path=ppt/theme/theme1.xml><?xml version="1.0" encoding="utf-8"?>
 <a:theme xmlns:a="http://schemas.openxmlformats.org/drawingml/2006/main" name="Office Theme">
   <a:themeElements>

</xml_diff>